<commit_message>
Add get book code to test get book function
</commit_message>
<xml_diff>
--- a/Document.pptx
+++ b/Document.pptx
@@ -10449,7 +10449,7 @@
         </p:nvSpPr>
         <p:spPr>
           <a:xfrm>
-            <a:off x="6101013" y="4228192"/>
+            <a:off x="6553200" y="4760140"/>
             <a:ext cx="1752600" cy="462306"/>
           </a:xfrm>
           <a:prstGeom prst="rect">
@@ -10491,7 +10491,7 @@
         </p:nvSpPr>
         <p:spPr>
           <a:xfrm>
-            <a:off x="6101013" y="3613852"/>
+            <a:off x="6553200" y="4145800"/>
             <a:ext cx="1752600" cy="462306"/>
           </a:xfrm>
           <a:prstGeom prst="rect">
@@ -11025,7 +11025,7 @@
         </p:nvSpPr>
         <p:spPr>
           <a:xfrm>
-            <a:off x="6705600" y="2429468"/>
+            <a:off x="6165182" y="2718409"/>
             <a:ext cx="1752600" cy="462306"/>
           </a:xfrm>
           <a:prstGeom prst="rect">
@@ -11071,7 +11071,7 @@
         <p:spPr>
           <a:xfrm>
             <a:off x="3924552" y="2545045"/>
-            <a:ext cx="2781048" cy="115576"/>
+            <a:ext cx="2240630" cy="404517"/>
           </a:xfrm>
           <a:prstGeom prst="bentConnector3">
             <a:avLst/>
@@ -11143,8 +11143,8 @@
         </p:nvCxnSpPr>
         <p:spPr>
           <a:xfrm flipV="1">
-            <a:off x="5018672" y="2660621"/>
-            <a:ext cx="1686928" cy="577883"/>
+            <a:off x="5018672" y="2949562"/>
+            <a:ext cx="1146510" cy="288942"/>
           </a:xfrm>
           <a:prstGeom prst="bentConnector3">
             <a:avLst/>
@@ -11177,7 +11177,7 @@
         </p:nvSpPr>
         <p:spPr>
           <a:xfrm>
-            <a:off x="762751" y="3390904"/>
+            <a:off x="548815" y="2776198"/>
             <a:ext cx="1208672" cy="462306"/>
           </a:xfrm>
           <a:prstGeom prst="rect">
@@ -11205,11 +11205,95 @@
             <a:pPr algn="ctr"/>
             <a:r>
               <a:rPr lang="en-US" smtClean="0"/>
-              <a:t>stop</a:t>
+              <a:t>stop()</a:t>
+            </a:r>
+            <a:endParaRPr lang="en-US"/>
+          </a:p>
+        </p:txBody>
+      </p:sp>
+      <p:sp>
+        <p:nvSpPr>
+          <p:cNvPr id="23" name="Rectangle 22"/>
+          <p:cNvSpPr/>
+          <p:nvPr/>
+        </p:nvSpPr>
+        <p:spPr>
+          <a:xfrm>
+            <a:off x="548815" y="3468383"/>
+            <a:ext cx="1208672" cy="462306"/>
+          </a:xfrm>
+          <a:prstGeom prst="rect">
+            <a:avLst/>
+          </a:prstGeom>
+        </p:spPr>
+        <p:style>
+          <a:lnRef idx="1">
+            <a:schemeClr val="accent2"/>
+          </a:lnRef>
+          <a:fillRef idx="2">
+            <a:schemeClr val="accent2"/>
+          </a:fillRef>
+          <a:effectRef idx="1">
+            <a:schemeClr val="accent2"/>
+          </a:effectRef>
+          <a:fontRef idx="minor">
+            <a:schemeClr val="dk1"/>
+          </a:fontRef>
+        </p:style>
+        <p:txBody>
+          <a:bodyPr rtlCol="0" anchor="ctr"/>
+          <a:lstStyle/>
+          <a:p>
+            <a:pPr algn="ctr"/>
+            <a:r>
+              <a:rPr lang="en-US" smtClean="0"/>
+              <a:t>getBook</a:t>
             </a:r>
             <a:r>
               <a:rPr lang="en-US" smtClean="0"/>
               <a:t>()</a:t>
+            </a:r>
+            <a:endParaRPr lang="en-US"/>
+          </a:p>
+        </p:txBody>
+      </p:sp>
+      <p:sp>
+        <p:nvSpPr>
+          <p:cNvPr id="26" name="Rectangle 25"/>
+          <p:cNvSpPr/>
+          <p:nvPr/>
+        </p:nvSpPr>
+        <p:spPr>
+          <a:xfrm>
+            <a:off x="6992353" y="1745215"/>
+            <a:ext cx="1752600" cy="462306"/>
+          </a:xfrm>
+          <a:prstGeom prst="rect">
+            <a:avLst/>
+          </a:prstGeom>
+        </p:spPr>
+        <p:style>
+          <a:lnRef idx="1">
+            <a:schemeClr val="accent1"/>
+          </a:lnRef>
+          <a:fillRef idx="2">
+            <a:schemeClr val="accent1"/>
+          </a:fillRef>
+          <a:effectRef idx="1">
+            <a:schemeClr val="accent1"/>
+          </a:effectRef>
+          <a:fontRef idx="minor">
+            <a:schemeClr val="dk1"/>
+          </a:fontRef>
+        </p:style>
+        <p:txBody>
+          <a:bodyPr rtlCol="0" anchor="ctr"/>
+          <a:lstStyle/>
+          <a:p>
+            <a:pPr algn="ctr"/>
+            <a:r>
+              <a:rPr lang="en-US" smtClean="0"/>
+              <a:t>#getBook</a:t>
             </a:r>
             <a:endParaRPr lang="en-US"/>
           </a:p>
@@ -11647,6 +11731,48 @@
           </a:fontRef>
         </p:style>
       </p:cxnSp>
+      <p:sp>
+        <p:nvSpPr>
+          <p:cNvPr id="12" name="Rectangle 11"/>
+          <p:cNvSpPr/>
+          <p:nvPr/>
+        </p:nvSpPr>
+        <p:spPr>
+          <a:xfrm>
+            <a:off x="1570121" y="4114800"/>
+            <a:ext cx="1752600" cy="462306"/>
+          </a:xfrm>
+          <a:prstGeom prst="rect">
+            <a:avLst/>
+          </a:prstGeom>
+        </p:spPr>
+        <p:style>
+          <a:lnRef idx="1">
+            <a:schemeClr val="accent2"/>
+          </a:lnRef>
+          <a:fillRef idx="2">
+            <a:schemeClr val="accent2"/>
+          </a:fillRef>
+          <a:effectRef idx="1">
+            <a:schemeClr val="accent2"/>
+          </a:effectRef>
+          <a:fontRef idx="minor">
+            <a:schemeClr val="dk1"/>
+          </a:fontRef>
+        </p:style>
+        <p:txBody>
+          <a:bodyPr rtlCol="0" anchor="ctr"/>
+          <a:lstStyle/>
+          <a:p>
+            <a:pPr algn="ctr"/>
+            <a:r>
+              <a:rPr lang="en-US" smtClean="0"/>
+              <a:t>book</a:t>
+            </a:r>
+            <a:endParaRPr lang="en-US"/>
+          </a:p>
+        </p:txBody>
+      </p:sp>
     </p:spTree>
     <p:extLst>
       <p:ext uri="{BB962C8B-B14F-4D97-AF65-F5344CB8AC3E}">

</xml_diff>